<commit_message>
latest version of the protocol pushed
</commit_message>
<xml_diff>
--- a/data/presentation/PS_presentation_FINAL.pptx
+++ b/data/presentation/PS_presentation_FINAL.pptx
@@ -3609,15 +3609,7 @@
             </a:pPr>
             <a:r>
               <a:rPr lang="en-US" dirty="0"/>
-              <a:t>For an easy access of the incoming an outgoing </a:t>
-            </a:r>
-            <a:r>
-              <a:rPr lang="en-US" dirty="0" err="1"/>
-              <a:t>pakets</a:t>
-            </a:r>
-            <a:r>
-              <a:rPr lang="en-US" dirty="0"/>
-              <a:t>, an easy expandable C-struct is used.</a:t>
+              <a:t>For an easy access of the incoming an outgoing packets, an easy expandable C-struct is used.</a:t>
             </a:r>
           </a:p>
           <a:p>
@@ -3980,7 +3972,15 @@
             </a:pPr>
             <a:r>
               <a:rPr lang="en-GB" dirty="0"/>
-              <a:t>When a packet is finished (so basically all data is updated, happening in 500Hz), the next layer comes on.  [CLICK]</a:t>
+              <a:t>When a packet is ready to </a:t>
+            </a:r>
+            <a:r>
+              <a:rPr lang="en-GB"/>
+              <a:t>get sent </a:t>
+            </a:r>
+            <a:r>
+              <a:rPr lang="en-GB" dirty="0"/>
+              <a:t>(so basically all data is updated, happening in 500Hz), the next layer comes on.  [CLICK]</a:t>
             </a:r>
           </a:p>
           <a:p>
@@ -7764,7 +7764,7 @@
                 </a:solidFill>
                 <a:latin typeface="+mn-lt"/>
               </a:rPr>
-              <a:t>12.08.18 | Projektseminar, Protocol design | Breitenbach, Chen, Hu </a:t>
+              <a:t>12.08.18 | Protocol Development | Breitenbach, Chen, Hu </a:t>
             </a:r>
             <a:r>
               <a:rPr lang="de-DE" sz="1000" dirty="0">
@@ -8599,16 +8599,16 @@
                 </a:solidFill>
                 <a:latin typeface="Arial"/>
               </a:rPr>
-              <a:t>12.08.18 | Protocol </a:t>
-            </a:r>
-            <a:r>
-              <a:rPr lang="de-DE" sz="1000" dirty="0" err="1">
+              <a:t>12.08.18 | </a:t>
+            </a:r>
+            <a:r>
+              <a:rPr lang="de-DE" sz="1000" dirty="0">
                 <a:solidFill>
                   <a:srgbClr val="000000"/>
                 </a:solidFill>
-                <a:latin typeface="Arial"/>
+                <a:latin typeface="+mn-lt"/>
               </a:rPr>
-              <a:t>development</a:t>
+              <a:t>Protocol Development </a:t>
             </a:r>
             <a:r>
               <a:rPr lang="de-DE" sz="1000" dirty="0">
@@ -8617,7 +8617,7 @@
                 </a:solidFill>
                 <a:latin typeface="Arial"/>
               </a:rPr>
-              <a:t> | Breitenbach, Chen, Hu |  </a:t>
+              <a:t>| Breitenbach, Chen, Hu |  </a:t>
             </a:r>
             <a:fld id="{D533869A-5E8B-4926-9AC7-B37A707100D4}" type="slidenum">
               <a:rPr lang="de-DE" sz="1000">
@@ -9274,111 +9274,15 @@
               </a:lnSpc>
             </a:pPr>
             <a:r>
-              <a:rPr lang="de-DE" sz="2400" b="1" dirty="0">
+              <a:rPr lang="en-GB" sz="2400" b="1" dirty="0">
                 <a:solidFill>
                   <a:srgbClr val="FFFFFF"/>
                 </a:solidFill>
               </a:rPr>
-              <a:t>Development </a:t>
-            </a:r>
-            <a:r>
-              <a:rPr lang="de-DE" sz="2400" b="1" dirty="0" err="1">
-                <a:solidFill>
-                  <a:srgbClr val="FFFFFF"/>
-                </a:solidFill>
-              </a:rPr>
-              <a:t>of</a:t>
-            </a:r>
-            <a:r>
-              <a:rPr lang="de-DE" sz="2400" b="1" dirty="0">
-                <a:solidFill>
-                  <a:srgbClr val="FFFFFF"/>
-                </a:solidFill>
-              </a:rPr>
-              <a:t> a </a:t>
-            </a:r>
-            <a:r>
-              <a:rPr lang="de-DE" sz="2400" b="1" dirty="0" err="1">
-                <a:solidFill>
-                  <a:srgbClr val="FFFFFF"/>
-                </a:solidFill>
-              </a:rPr>
-              <a:t>protocol</a:t>
-            </a:r>
-            <a:r>
-              <a:rPr lang="de-DE" sz="2400" b="1" dirty="0">
-                <a:solidFill>
-                  <a:srgbClr val="FFFFFF"/>
-                </a:solidFill>
-              </a:rPr>
-              <a:t> </a:t>
-            </a:r>
-            <a:r>
-              <a:rPr lang="de-DE" sz="2400" b="1" dirty="0" err="1">
-                <a:solidFill>
-                  <a:srgbClr val="FFFFFF"/>
-                </a:solidFill>
-              </a:rPr>
-              <a:t>for</a:t>
-            </a:r>
-            <a:r>
-              <a:rPr lang="de-DE" sz="2400" b="1" dirty="0">
-                <a:solidFill>
-                  <a:srgbClr val="FFFFFF"/>
-                </a:solidFill>
-              </a:rPr>
-              <a:t> </a:t>
-            </a:r>
-            <a:r>
-              <a:rPr lang="de-DE" sz="2400" b="1" dirty="0" err="1">
-                <a:solidFill>
-                  <a:srgbClr val="FFFFFF"/>
-                </a:solidFill>
-              </a:rPr>
-              <a:t>inclusion</a:t>
-            </a:r>
-            <a:r>
-              <a:rPr lang="de-DE" sz="2400" b="1" dirty="0">
-                <a:solidFill>
-                  <a:srgbClr val="FFFFFF"/>
-                </a:solidFill>
-              </a:rPr>
-              <a:t> </a:t>
-            </a:r>
-            <a:r>
-              <a:rPr lang="de-DE" sz="2400" b="1" dirty="0" err="1">
-                <a:solidFill>
-                  <a:srgbClr val="FFFFFF"/>
-                </a:solidFill>
-              </a:rPr>
-              <a:t>of</a:t>
-            </a:r>
-            <a:r>
-              <a:rPr lang="de-DE" sz="2400" b="1" dirty="0">
-                <a:solidFill>
-                  <a:srgbClr val="FFFFFF"/>
-                </a:solidFill>
-              </a:rPr>
-              <a:t> an </a:t>
-            </a:r>
-            <a:r>
-              <a:rPr lang="de-DE" sz="2400" b="1" dirty="0" err="1">
-                <a:solidFill>
-                  <a:srgbClr val="FFFFFF"/>
-                </a:solidFill>
-              </a:rPr>
-              <a:t>microcontroller</a:t>
-            </a:r>
-            <a:r>
-              <a:rPr lang="de-DE" sz="2400" b="1" dirty="0">
-                <a:solidFill>
-                  <a:srgbClr val="FFFFFF"/>
-                </a:solidFill>
-              </a:rPr>
-              <a:t> in an </a:t>
-            </a:r>
-            <a:r>
-              <a:rPr lang="de-DE" sz="2400" b="1" dirty="0" err="1">
+              <a:t>Development of a protocol for inclusion of an microcontroller in an </a:t>
+            </a:r>
+            <a:r>
+              <a:rPr lang="en-GB" sz="2400" b="1" dirty="0" err="1">
                 <a:solidFill>
                   <a:srgbClr val="FFFFFF"/>
                 </a:solidFill>
@@ -9386,30 +9290,14 @@
               <a:t>multicopter</a:t>
             </a:r>
             <a:r>
-              <a:rPr lang="de-DE" sz="2400" b="1" dirty="0">
+              <a:rPr lang="en-GB" sz="2400" b="1" dirty="0">
                 <a:solidFill>
                   <a:srgbClr val="FFFFFF"/>
                 </a:solidFill>
               </a:rPr>
-              <a:t> </a:t>
-            </a:r>
-            <a:r>
-              <a:rPr lang="de-DE" sz="2400" b="1" dirty="0" err="1">
-                <a:solidFill>
-                  <a:srgbClr val="FFFFFF"/>
-                </a:solidFill>
-              </a:rPr>
-              <a:t>system</a:t>
-            </a:r>
-            <a:r>
-              <a:rPr lang="de-DE" sz="2400" b="1" dirty="0">
-                <a:solidFill>
-                  <a:srgbClr val="FFFFFF"/>
-                </a:solidFill>
-              </a:rPr>
-              <a:t> </a:t>
-            </a:r>
-            <a:endParaRPr sz="2400" dirty="0"/>
+              <a:t> system </a:t>
+            </a:r>
+            <a:endParaRPr lang="en-GB" sz="2400" dirty="0"/>
           </a:p>
         </p:txBody>
       </p:sp>
@@ -11053,7 +10941,7 @@
               <a:buChar char="•"/>
             </a:pPr>
             <a:r>
-              <a:rPr lang="en-US" altLang="zh-CN" sz="2800"/>
+              <a:rPr lang="en-US" altLang="zh-CN" sz="2800" dirty="0"/>
               <a:t>Tested protocol</a:t>
             </a:r>
           </a:p>
@@ -11066,7 +10954,7 @@
               <a:buChar char="•"/>
             </a:pPr>
             <a:r>
-              <a:rPr lang="en-US" altLang="zh-CN" sz="2800"/>
+              <a:rPr lang="en-US" altLang="zh-CN" sz="2800" dirty="0"/>
               <a:t>500Hz packet exchange rate</a:t>
             </a:r>
           </a:p>
@@ -11079,7 +10967,7 @@
               <a:buChar char="•"/>
             </a:pPr>
             <a:r>
-              <a:rPr lang="en-US" altLang="zh-CN" sz="2800"/>
+              <a:rPr lang="en-US" altLang="zh-CN" sz="2800" dirty="0"/>
               <a:t>Real control performance not tested</a:t>
             </a:r>
           </a:p>
@@ -11924,7 +11812,7 @@
           </a:lstStyle>
           <a:p>
             <a:r>
-              <a:rPr lang="en-GB" dirty="0"/>
+              <a:rPr lang="en-GB" sz="2000" dirty="0"/>
               <a:t>Motivation</a:t>
             </a:r>
           </a:p>
@@ -11935,21 +11823,21 @@
               </a:lnSpc>
             </a:pPr>
             <a:r>
-              <a:rPr lang="en-GB" dirty="0"/>
+              <a:rPr lang="en-GB" sz="2000" dirty="0"/>
               <a:t>Basics</a:t>
             </a:r>
           </a:p>
           <a:p>
             <a:pPr lvl="1"/>
             <a:r>
-              <a:rPr lang="en-GB" dirty="0"/>
+              <a:rPr lang="en-GB" sz="2000" dirty="0"/>
               <a:t>System description</a:t>
             </a:r>
           </a:p>
           <a:p>
             <a:pPr lvl="1"/>
             <a:r>
-              <a:rPr lang="en-GB" dirty="0"/>
+              <a:rPr lang="en-GB" sz="2000" dirty="0"/>
               <a:t>Protocols</a:t>
             </a:r>
           </a:p>
@@ -11960,22 +11848,21 @@
               </a:lnSpc>
             </a:pPr>
             <a:r>
-              <a:rPr lang="en-GB" dirty="0" err="1"/>
-              <a:t>Protocoldesign</a:t>
-            </a:r>
-            <a:endParaRPr lang="en-GB" dirty="0"/>
+              <a:rPr lang="en-GB" sz="2000" dirty="0"/>
+              <a:t>Protocol design</a:t>
+            </a:r>
           </a:p>
           <a:p>
             <a:pPr lvl="1"/>
             <a:r>
-              <a:rPr lang="en-GB" dirty="0"/>
+              <a:rPr lang="en-GB" sz="2000" dirty="0"/>
               <a:t>Presentation</a:t>
             </a:r>
           </a:p>
           <a:p>
             <a:pPr lvl="1"/>
             <a:r>
-              <a:rPr lang="en-GB" dirty="0"/>
+              <a:rPr lang="en-GB" sz="2000" dirty="0"/>
               <a:t>Results</a:t>
             </a:r>
           </a:p>
@@ -11986,7 +11873,7 @@
               </a:lnSpc>
             </a:pPr>
             <a:r>
-              <a:rPr lang="en-GB" dirty="0"/>
+              <a:rPr lang="en-GB" sz="2000" dirty="0"/>
               <a:t>Summary &amp; Outlook</a:t>
             </a:r>
           </a:p>

</xml_diff>